<commit_message>
deleted extra csv files, added project paper
</commit_message>
<xml_diff>
--- a/project-presentation.pptx
+++ b/project-presentation.pptx
@@ -32,8 +32,8 @@
     <p:sldId id="303" r:id="rId23"/>
     <p:sldId id="347" r:id="rId24"/>
     <p:sldId id="341" r:id="rId25"/>
-    <p:sldId id="306" r:id="rId26"/>
-    <p:sldId id="302" r:id="rId27"/>
+    <p:sldId id="302" r:id="rId26"/>
+    <p:sldId id="306" r:id="rId27"/>
     <p:sldId id="323" r:id="rId28"/>
     <p:sldId id="335" r:id="rId29"/>
     <p:sldId id="336" r:id="rId30"/>
@@ -1101,7 +1101,7 @@
           <a:p>
             <a:fld id="{6A2EE0E5-999F-FB48-B8EB-A3E963776233}" type="slidenum">
               <a:rPr lang="en-US" smtClean="0"/>
-              <a:t>25</a:t>
+              <a:t>26</a:t>
             </a:fld>
             <a:endParaRPr lang="en-US"/>
           </a:p>
@@ -5486,7 +5486,7 @@
                 </a:solidFill>
                 <a:effectLst/>
               </a:rPr>
-              <a:t>Predict the probability of all possible matchup between the 64 teams selected for the 2023 College Basketball Tournament  (64 * 63/2 = 2,048 predictions)</a:t>
+              <a:t>Predict the probability of all possible matchup between the 64 teams selected for the College Basketball Tournament  (64 * 63/2 = 2,048 predictions)</a:t>
             </a:r>
           </a:p>
         </p:txBody>
@@ -11099,86 +11099,6 @@
       </p:grpSpPr>
       <p:sp>
         <p:nvSpPr>
-          <p:cNvPr id="2" name="Title 1">
-            <a:extLst>
-              <a:ext uri="{FF2B5EF4-FFF2-40B4-BE49-F238E27FC236}">
-                <a16:creationId xmlns:a16="http://schemas.microsoft.com/office/drawing/2014/main" id="{91556312-D863-0258-95A6-3C3D9EFE4F0C}"/>
-              </a:ext>
-            </a:extLst>
-          </p:cNvPr>
-          <p:cNvSpPr>
-            <a:spLocks noGrp="1"/>
-          </p:cNvSpPr>
-          <p:nvPr>
-            <p:ph type="ctrTitle"/>
-          </p:nvPr>
-        </p:nvSpPr>
-        <p:spPr>
-          <a:xfrm>
-            <a:off x="578426" y="2356506"/>
-            <a:ext cx="11035147" cy="2144988"/>
-          </a:xfrm>
-        </p:spPr>
-        <p:txBody>
-          <a:bodyPr anchor="ctr">
-            <a:normAutofit/>
-          </a:bodyPr>
-          <a:lstStyle/>
-          <a:p>
-            <a:r>
-              <a:rPr lang="en-US" sz="4400" b="1" dirty="0">
-                <a:solidFill>
-                  <a:schemeClr val="tx2"/>
-                </a:solidFill>
-                <a:latin typeface="SF Compact Rounded Heavy" pitchFamily="2" charset="77"/>
-                <a:ea typeface="SF Pro Display" pitchFamily="2" charset="0"/>
-                <a:cs typeface="Nirmala Text" panose="020B0604020202020204" pitchFamily="34" charset="0"/>
-              </a:rPr>
-              <a:t>Results</a:t>
-            </a:r>
-            <a:endParaRPr lang="en-US" sz="2400" b="1" dirty="0">
-              <a:solidFill>
-                <a:schemeClr val="tx2"/>
-              </a:solidFill>
-              <a:latin typeface="SF Compact Rounded Heavy" pitchFamily="2" charset="77"/>
-              <a:ea typeface="SF Pro Display" pitchFamily="2" charset="0"/>
-              <a:cs typeface="Nirmala Text" panose="020B0604020202020204" pitchFamily="34" charset="0"/>
-            </a:endParaRPr>
-          </a:p>
-        </p:txBody>
-      </p:sp>
-    </p:spTree>
-    <p:extLst>
-      <p:ext uri="{BB962C8B-B14F-4D97-AF65-F5344CB8AC3E}">
-        <p14:creationId xmlns:p14="http://schemas.microsoft.com/office/powerpoint/2010/main" val="25825248"/>
-      </p:ext>
-    </p:extLst>
-  </p:cSld>
-  <p:clrMapOvr>
-    <a:masterClrMapping/>
-  </p:clrMapOvr>
-</p:sld>
-</file>
-
-<file path=ppt/slides/slide26.xml><?xml version="1.0" encoding="utf-8"?>
-<p:sld xmlns:a="http://schemas.openxmlformats.org/drawingml/2006/main" xmlns:r="http://schemas.openxmlformats.org/officeDocument/2006/relationships" xmlns:p="http://schemas.openxmlformats.org/presentationml/2006/main">
-  <p:cSld>
-    <p:spTree>
-      <p:nvGrpSpPr>
-        <p:cNvPr id="1" name=""/>
-        <p:cNvGrpSpPr/>
-        <p:nvPr/>
-      </p:nvGrpSpPr>
-      <p:grpSpPr>
-        <a:xfrm>
-          <a:off x="0" y="0"/>
-          <a:ext cx="0" cy="0"/>
-          <a:chOff x="0" y="0"/>
-          <a:chExt cx="0" cy="0"/>
-        </a:xfrm>
-      </p:grpSpPr>
-      <p:sp>
-        <p:nvSpPr>
           <p:cNvPr id="2" name="Text Placeholder 1">
             <a:extLst>
               <a:ext uri="{FF2B5EF4-FFF2-40B4-BE49-F238E27FC236}">
@@ -11282,7 +11202,7 @@
             <a:fld id="{1E7E87EC-D468-6B42-A141-7B085F32EA20}" type="slidenum">
               <a:rPr lang="en-US" smtClean="0"/>
               <a:pPr/>
-              <a:t>26</a:t>
+              <a:t>25</a:t>
             </a:fld>
             <a:endParaRPr lang="en-US" dirty="0"/>
           </a:p>
@@ -13604,6 +13524,86 @@
 </p:sld>
 </file>
 
+<file path=ppt/slides/slide26.xml><?xml version="1.0" encoding="utf-8"?>
+<p:sld xmlns:a="http://schemas.openxmlformats.org/drawingml/2006/main" xmlns:r="http://schemas.openxmlformats.org/officeDocument/2006/relationships" xmlns:p="http://schemas.openxmlformats.org/presentationml/2006/main">
+  <p:cSld>
+    <p:spTree>
+      <p:nvGrpSpPr>
+        <p:cNvPr id="1" name=""/>
+        <p:cNvGrpSpPr/>
+        <p:nvPr/>
+      </p:nvGrpSpPr>
+      <p:grpSpPr>
+        <a:xfrm>
+          <a:off x="0" y="0"/>
+          <a:ext cx="0" cy="0"/>
+          <a:chOff x="0" y="0"/>
+          <a:chExt cx="0" cy="0"/>
+        </a:xfrm>
+      </p:grpSpPr>
+      <p:sp>
+        <p:nvSpPr>
+          <p:cNvPr id="2" name="Title 1">
+            <a:extLst>
+              <a:ext uri="{FF2B5EF4-FFF2-40B4-BE49-F238E27FC236}">
+                <a16:creationId xmlns:a16="http://schemas.microsoft.com/office/drawing/2014/main" id="{91556312-D863-0258-95A6-3C3D9EFE4F0C}"/>
+              </a:ext>
+            </a:extLst>
+          </p:cNvPr>
+          <p:cNvSpPr>
+            <a:spLocks noGrp="1"/>
+          </p:cNvSpPr>
+          <p:nvPr>
+            <p:ph type="ctrTitle"/>
+          </p:nvPr>
+        </p:nvSpPr>
+        <p:spPr>
+          <a:xfrm>
+            <a:off x="578426" y="2356506"/>
+            <a:ext cx="11035147" cy="2144988"/>
+          </a:xfrm>
+        </p:spPr>
+        <p:txBody>
+          <a:bodyPr anchor="ctr">
+            <a:normAutofit/>
+          </a:bodyPr>
+          <a:lstStyle/>
+          <a:p>
+            <a:r>
+              <a:rPr lang="en-US" sz="4400" b="1" dirty="0">
+                <a:solidFill>
+                  <a:schemeClr val="tx2"/>
+                </a:solidFill>
+                <a:latin typeface="SF Compact Rounded Heavy" pitchFamily="2" charset="77"/>
+                <a:ea typeface="SF Pro Display" pitchFamily="2" charset="0"/>
+                <a:cs typeface="Nirmala Text" panose="020B0604020202020204" pitchFamily="34" charset="0"/>
+              </a:rPr>
+              <a:t>Results</a:t>
+            </a:r>
+            <a:endParaRPr lang="en-US" sz="2400" b="1" dirty="0">
+              <a:solidFill>
+                <a:schemeClr val="tx2"/>
+              </a:solidFill>
+              <a:latin typeface="SF Compact Rounded Heavy" pitchFamily="2" charset="77"/>
+              <a:ea typeface="SF Pro Display" pitchFamily="2" charset="0"/>
+              <a:cs typeface="Nirmala Text" panose="020B0604020202020204" pitchFamily="34" charset="0"/>
+            </a:endParaRPr>
+          </a:p>
+        </p:txBody>
+      </p:sp>
+    </p:spTree>
+    <p:extLst>
+      <p:ext uri="{BB962C8B-B14F-4D97-AF65-F5344CB8AC3E}">
+        <p14:creationId xmlns:p14="http://schemas.microsoft.com/office/powerpoint/2010/main" val="25825248"/>
+      </p:ext>
+    </p:extLst>
+  </p:cSld>
+  <p:clrMapOvr>
+    <a:masterClrMapping/>
+  </p:clrMapOvr>
+</p:sld>
+</file>
+
 <file path=ppt/slides/slide27.xml><?xml version="1.0" encoding="utf-8"?>
 <p:sld xmlns:a="http://schemas.openxmlformats.org/drawingml/2006/main" xmlns:r="http://schemas.openxmlformats.org/officeDocument/2006/relationships" xmlns:p="http://schemas.openxmlformats.org/presentationml/2006/main">
   <p:cSld>
@@ -15463,7 +15463,7 @@
 </file>
 
 <file path=ppt/slides/slide29.xml><?xml version="1.0" encoding="utf-8"?>
-<p:sld xmlns:a="http://schemas.openxmlformats.org/drawingml/2006/main" xmlns:r="http://schemas.openxmlformats.org/officeDocument/2006/relationships" xmlns:p="http://schemas.openxmlformats.org/presentationml/2006/main">
+<p:sld xmlns:a="http://schemas.openxmlformats.org/drawingml/2006/main" xmlns:r="http://schemas.openxmlformats.org/officeDocument/2006/relationships" xmlns:p="http://schemas.openxmlformats.org/presentationml/2006/main" show="0">
   <p:cSld>
     <p:spTree>
       <p:nvGrpSpPr>
@@ -15807,7 +15807,7 @@
 </file>
 
 <file path=ppt/slides/slide30.xml><?xml version="1.0" encoding="utf-8"?>
-<p:sld xmlns:a="http://schemas.openxmlformats.org/drawingml/2006/main" xmlns:r="http://schemas.openxmlformats.org/officeDocument/2006/relationships" xmlns:p="http://schemas.openxmlformats.org/presentationml/2006/main">
+<p:sld xmlns:a="http://schemas.openxmlformats.org/drawingml/2006/main" xmlns:r="http://schemas.openxmlformats.org/officeDocument/2006/relationships" xmlns:p="http://schemas.openxmlformats.org/presentationml/2006/main" show="0">
   <p:cSld>
     <p:spTree>
       <p:nvGrpSpPr>
@@ -16071,7 +16071,7 @@
 </file>
 
 <file path=ppt/slides/slide31.xml><?xml version="1.0" encoding="utf-8"?>
-<p:sld xmlns:a="http://schemas.openxmlformats.org/drawingml/2006/main" xmlns:r="http://schemas.openxmlformats.org/officeDocument/2006/relationships" xmlns:p="http://schemas.openxmlformats.org/presentationml/2006/main">
+<p:sld xmlns:a="http://schemas.openxmlformats.org/drawingml/2006/main" xmlns:r="http://schemas.openxmlformats.org/officeDocument/2006/relationships" xmlns:p="http://schemas.openxmlformats.org/presentationml/2006/main" show="0">
   <p:cSld>
     <p:spTree>
       <p:nvGrpSpPr>
@@ -17694,7 +17694,25 @@
                 <a:cs typeface="Nunito"/>
                 <a:sym typeface="Nunito"/>
               </a:rPr>
-              <a:t>’ and ‘</a:t>
+              <a:t>’ and </a:t>
+            </a:r>
+            <a:r>
+              <a:rPr lang="en-US">
+                <a:latin typeface="Nunito"/>
+                <a:ea typeface="Nunito"/>
+                <a:cs typeface="Nunito"/>
+                <a:sym typeface="Nunito"/>
+              </a:rPr>
+              <a:t>‘</a:t>
+            </a:r>
+            <a:r>
+              <a:rPr lang="en-US" b="1">
+                <a:latin typeface="Nunito"/>
+                <a:ea typeface="Nunito"/>
+                <a:cs typeface="Nunito"/>
+                <a:sym typeface="Nunito"/>
+              </a:rPr>
+              <a:t>tired </a:t>
             </a:r>
             <a:r>
               <a:rPr lang="en-US" b="1" dirty="0">
@@ -17703,7 +17721,7 @@
                 <a:cs typeface="Nunito"/>
                 <a:sym typeface="Nunito"/>
               </a:rPr>
-              <a:t>tried team</a:t>
+              <a:t>team</a:t>
             </a:r>
             <a:r>
               <a:rPr lang="en-US" dirty="0">

</xml_diff>